<commit_message>
Added plot with God positions
</commit_message>
<xml_diff>
--- a/poster/lex2018_poster_Ballonleine.pptx
+++ b/poster/lex2018_poster_Ballonleine.pptx
@@ -295,7 +295,7 @@
               <a:pPr>
                 <a:defRPr/>
               </a:pPr>
-              <a:t>06.09.18</a:t>
+              <a:t>11.09.2018</a:t>
             </a:fld>
             <a:endParaRPr lang="de-DE"/>
           </a:p>
@@ -598,7 +598,7 @@
               <a14:shadowObscured xmlns:a14="http://schemas.microsoft.com/office/drawing/2010/main" val="1"/>
             </a:ext>
             <a:ext uri="{FAA26D3D-D897-4be2-8F04-BA451C77F1D7}">
-              <ma14:placeholderFlag xmlns:ma14="http://schemas.microsoft.com/office/mac/drawingml/2011/main" val="1"/>
+              <ma14:placeholderFlag xmlns:ma14="http://schemas.microsoft.com/office/mac/drawingml/2011/main" xmlns="" val="1"/>
             </a:ext>
           </a:extLst>
         </p:spPr>
@@ -1148,7 +1148,7 @@
           <a:noFill/>
           <a:extLst>
             <a:ext uri="{FAA26D3D-D897-4be2-8F04-BA451C77F1D7}">
-              <ma14:placeholderFlag xmlns:ma14="http://schemas.microsoft.com/office/mac/drawingml/2011/main" val="1"/>
+              <ma14:placeholderFlag xmlns:ma14="http://schemas.microsoft.com/office/mac/drawingml/2011/main" xmlns="" val="1"/>
             </a:ext>
           </a:extLst>
         </p:spPr>
@@ -3529,7 +3529,7 @@
           <p:nvPr/>
         </p:nvPicPr>
         <p:blipFill>
-          <a:blip r:embed="rId7">
+          <a:blip r:embed="rId7" cstate="email">
             <a:extLst>
               <a:ext uri="{28A0092B-C50C-407E-A947-70E740481C1C}">
                 <a14:useLocalDpi xmlns:a14="http://schemas.microsoft.com/office/drawing/2010/main" val="0"/>
@@ -3544,6 +3544,41 @@
           <a:xfrm>
             <a:off x="10948690" y="7647602"/>
             <a:ext cx="17078348" cy="10484302"/>
+          </a:xfrm>
+          <a:prstGeom prst="rect">
+            <a:avLst/>
+          </a:prstGeom>
+        </p:spPr>
+      </p:pic>
+      <p:pic>
+        <p:nvPicPr>
+          <p:cNvPr id="8" name="Grafik 7">
+            <a:extLst>
+              <a:ext uri="{FF2B5EF4-FFF2-40B4-BE49-F238E27FC236}">
+                <a16:creationId xmlns:a16="http://schemas.microsoft.com/office/drawing/2014/main" id="{C0874743-36AF-4A5E-B1D5-200D0CCDDECC}"/>
+              </a:ext>
+            </a:extLst>
+          </p:cNvPr>
+          <p:cNvPicPr>
+            <a:picLocks noChangeAspect="1"/>
+          </p:cNvPicPr>
+          <p:nvPr/>
+        </p:nvPicPr>
+        <p:blipFill rotWithShape="1">
+          <a:blip r:embed="rId8">
+            <a:extLst>
+              <a:ext uri="{28A0092B-C50C-407E-A947-70E740481C1C}">
+                <a14:useLocalDpi xmlns:a14="http://schemas.microsoft.com/office/drawing/2010/main" val="0"/>
+              </a:ext>
+            </a:extLst>
+          </a:blip>
+          <a:srcRect l="18514" t="5919" r="16229" b="5739"/>
+          <a:stretch/>
+        </p:blipFill>
+        <p:spPr>
+          <a:xfrm>
+            <a:off x="12587332" y="20055858"/>
+            <a:ext cx="15409712" cy="14893349"/>
           </a:xfrm>
           <a:prstGeom prst="rect">
             <a:avLst/>

</xml_diff>

<commit_message>
little aesthetic changes, fixed the logo postion and some typos
</commit_message>
<xml_diff>
--- a/poster/lex2018_poster_Ballonleine.pptx
+++ b/poster/lex2018_poster_Ballonleine.pptx
@@ -295,7 +295,7 @@
               <a:pPr>
                 <a:defRPr/>
               </a:pPr>
-              <a:t>11.09.2018</a:t>
+              <a:t>28.09.2018</a:t>
             </a:fld>
             <a:endParaRPr lang="de-DE"/>
           </a:p>
@@ -598,7 +598,7 @@
               <a14:shadowObscured xmlns:a14="http://schemas.microsoft.com/office/drawing/2010/main" val="1"/>
             </a:ext>
             <a:ext uri="{FAA26D3D-D897-4be2-8F04-BA451C77F1D7}">
-              <ma14:placeholderFlag xmlns:ma14="http://schemas.microsoft.com/office/mac/drawingml/2011/main" xmlns="" val="1"/>
+              <ma14:placeholderFlag xmlns="" xmlns:ma14="http://schemas.microsoft.com/office/mac/drawingml/2011/main" val="1"/>
             </a:ext>
           </a:extLst>
         </p:spPr>
@@ -1148,7 +1148,7 @@
           <a:noFill/>
           <a:extLst>
             <a:ext uri="{FAA26D3D-D897-4be2-8F04-BA451C77F1D7}">
-              <ma14:placeholderFlag xmlns:ma14="http://schemas.microsoft.com/office/mac/drawingml/2011/main" xmlns="" val="1"/>
+              <ma14:placeholderFlag xmlns="" xmlns:ma14="http://schemas.microsoft.com/office/mac/drawingml/2011/main" val="1"/>
             </a:ext>
           </a:extLst>
         </p:spPr>
@@ -1164,6 +1164,11 @@
         </p:txBody>
       </p:sp>
     </p:spTree>
+    <p:extLst>
+      <p:ext uri="{BB962C8B-B14F-4D97-AF65-F5344CB8AC3E}">
+        <p14:creationId xmlns:p14="http://schemas.microsoft.com/office/powerpoint/2010/main" val="3080381064"/>
+      </p:ext>
+    </p:extLst>
   </p:cSld>
   <p:clrMapOvr>
     <a:masterClrMapping/>
@@ -3555,7 +3560,7 @@
           <p:cNvPr id="8" name="Grafik 7">
             <a:extLst>
               <a:ext uri="{FF2B5EF4-FFF2-40B4-BE49-F238E27FC236}">
-                <a16:creationId xmlns:a16="http://schemas.microsoft.com/office/drawing/2014/main" id="{C0874743-36AF-4A5E-B1D5-200D0CCDDECC}"/>
+                <a16:creationId xmlns:a16="http://schemas.microsoft.com/office/drawing/2014/main" xmlns="" id="{C0874743-36AF-4A5E-B1D5-200D0CCDDECC}"/>
               </a:ext>
             </a:extLst>
           </p:cNvPr>
@@ -3579,6 +3584,36 @@
           <a:xfrm>
             <a:off x="12587332" y="20055858"/>
             <a:ext cx="15409712" cy="14893349"/>
+          </a:xfrm>
+          <a:prstGeom prst="rect">
+            <a:avLst/>
+          </a:prstGeom>
+        </p:spPr>
+      </p:pic>
+      <p:pic>
+        <p:nvPicPr>
+          <p:cNvPr id="19" name="Bild 15"/>
+          <p:cNvPicPr>
+            <a:picLocks noChangeAspect="1"/>
+          </p:cNvPicPr>
+          <p:nvPr/>
+        </p:nvPicPr>
+        <p:blipFill>
+          <a:blip r:embed="rId9" cstate="email">
+            <a:extLst>
+              <a:ext uri="{28A0092B-C50C-407E-A947-70E740481C1C}">
+                <a14:useLocalDpi xmlns:a14="http://schemas.microsoft.com/office/drawing/2010/main" val="0"/>
+              </a:ext>
+            </a:extLst>
+          </a:blip>
+          <a:stretch>
+            <a:fillRect/>
+          </a:stretch>
+        </p:blipFill>
+        <p:spPr>
+          <a:xfrm>
+            <a:off x="12905358" y="37544733"/>
+            <a:ext cx="6997768" cy="4673896"/>
           </a:xfrm>
           <a:prstGeom prst="rect">
             <a:avLst/>

</xml_diff>